<commit_message>
use root from chords
</commit_message>
<xml_diff>
--- a/Music_MaskGAN_Presentation.pptx
+++ b/Music_MaskGAN_Presentation.pptx
@@ -237,13 +237,6 @@
           </ac:picMkLst>
         </pc:picChg>
       </pc:sldChg>
-      <pc:sldChg chg="del">
-        <pc:chgData name="Gregory Johnsen" userId="11dce2cc50fab8c6" providerId="LiveId" clId="{EEBF9544-968E-4E16-A2CF-1C98E2121CF2}" dt="2018-04-24T02:17:46.877" v="807" actId="2696"/>
-        <pc:sldMkLst>
-          <pc:docMk/>
-          <pc:sldMk cId="1277052402" sldId="258"/>
-        </pc:sldMkLst>
-      </pc:sldChg>
       <pc:sldChg chg="addSp modSp">
         <pc:chgData name="Gregory Johnsen" userId="11dce2cc50fab8c6" providerId="LiveId" clId="{EEBF9544-968E-4E16-A2CF-1C98E2121CF2}" dt="2018-04-24T01:40:16.503" v="650" actId="20577"/>
         <pc:sldMkLst>
@@ -360,13 +353,6 @@
             <ac:spMk id="10" creationId="{8A083118-F02D-4386-9C77-44DF7C6238E8}"/>
           </ac:spMkLst>
         </pc:spChg>
-      </pc:sldChg>
-      <pc:sldChg chg="del">
-        <pc:chgData name="Gregory Johnsen" userId="11dce2cc50fab8c6" providerId="LiveId" clId="{EEBF9544-968E-4E16-A2CF-1C98E2121CF2}" dt="2018-04-24T02:16:53.849" v="803" actId="2696"/>
-        <pc:sldMkLst>
-          <pc:docMk/>
-          <pc:sldMk cId="3334288172" sldId="262"/>
-        </pc:sldMkLst>
       </pc:sldChg>
       <pc:sldChg chg="modSp">
         <pc:chgData name="Gregory Johnsen" userId="11dce2cc50fab8c6" providerId="LiveId" clId="{EEBF9544-968E-4E16-A2CF-1C98E2121CF2}" dt="2018-04-24T02:14:43.609" v="795" actId="20577"/>
@@ -498,27 +484,6 @@
           </ac:picMkLst>
         </pc:picChg>
       </pc:sldChg>
-      <pc:sldChg chg="add del">
-        <pc:chgData name="Gregory Johnsen" userId="11dce2cc50fab8c6" providerId="LiveId" clId="{EEBF9544-968E-4E16-A2CF-1C98E2121CF2}" dt="2018-04-24T01:12:17.945" v="334" actId="12789"/>
-        <pc:sldMkLst>
-          <pc:docMk/>
-          <pc:sldMk cId="427616701" sldId="272"/>
-        </pc:sldMkLst>
-      </pc:sldChg>
-      <pc:sldChg chg="add del">
-        <pc:chgData name="Gregory Johnsen" userId="11dce2cc50fab8c6" providerId="LiveId" clId="{EEBF9544-968E-4E16-A2CF-1C98E2121CF2}" dt="2018-04-24T01:13:05.104" v="379" actId="12789"/>
-        <pc:sldMkLst>
-          <pc:docMk/>
-          <pc:sldMk cId="2464204102" sldId="272"/>
-        </pc:sldMkLst>
-      </pc:sldChg>
-      <pc:sldChg chg="add del">
-        <pc:chgData name="Gregory Johnsen" userId="11dce2cc50fab8c6" providerId="LiveId" clId="{EEBF9544-968E-4E16-A2CF-1C98E2121CF2}" dt="2018-04-24T01:13:09.729" v="381" actId="12789"/>
-        <pc:sldMkLst>
-          <pc:docMk/>
-          <pc:sldMk cId="2903361530" sldId="272"/>
-        </pc:sldMkLst>
-      </pc:sldChg>
       <pc:sldChg chg="delSp modSp add">
         <pc:chgData name="Gregory Johnsen" userId="11dce2cc50fab8c6" providerId="LiveId" clId="{EEBF9544-968E-4E16-A2CF-1C98E2121CF2}" dt="2018-04-24T01:16:43.779" v="402" actId="6549"/>
         <pc:sldMkLst>
@@ -541,13 +506,6 @@
             <ac:picMk id="4" creationId="{ACE68676-0A9E-43CD-873D-B246DD31C39A}"/>
           </ac:picMkLst>
         </pc:picChg>
-      </pc:sldChg>
-      <pc:sldChg chg="add del">
-        <pc:chgData name="Gregory Johnsen" userId="11dce2cc50fab8c6" providerId="LiveId" clId="{EEBF9544-968E-4E16-A2CF-1C98E2121CF2}" dt="2018-04-24T01:49:06.897" v="659" actId="12789"/>
-        <pc:sldMkLst>
-          <pc:docMk/>
-          <pc:sldMk cId="307659243" sldId="273"/>
-        </pc:sldMkLst>
       </pc:sldChg>
       <pc:sldChg chg="delSp modSp add">
         <pc:chgData name="Gregory Johnsen" userId="11dce2cc50fab8c6" providerId="LiveId" clId="{EEBF9544-968E-4E16-A2CF-1C98E2121CF2}" dt="2018-04-24T02:02:45.300" v="791" actId="114"/>
@@ -707,32 +665,16 @@
   <pc:docChgLst>
     <pc:chgData name="Ling Lin" userId="3d6e919fa8345f6d" providerId="LiveId" clId="{D365C901-0AEA-4ED5-8477-EC8CE4BC4AF5}"/>
     <pc:docChg chg="custSel addSld delSld modSld">
-      <pc:chgData name="Ling Lin" userId="3d6e919fa8345f6d" providerId="LiveId" clId="{D365C901-0AEA-4ED5-8477-EC8CE4BC4AF5}" dt="2018-04-24T02:38:22.555" v="169"/>
+      <pc:chgData name="Ling Lin" userId="3d6e919fa8345f6d" providerId="LiveId" clId="{D365C901-0AEA-4ED5-8477-EC8CE4BC4AF5}" dt="2018-04-26T04:11:41.119" v="192" actId="1076"/>
       <pc:docMkLst>
         <pc:docMk/>
       </pc:docMkLst>
-      <pc:sldChg chg="addSp delSp modSp delAnim modAnim">
-        <pc:chgData name="Ling Lin" userId="3d6e919fa8345f6d" providerId="LiveId" clId="{D365C901-0AEA-4ED5-8477-EC8CE4BC4AF5}" dt="2018-04-23T05:08:32.606" v="22" actId="478"/>
+      <pc:sldChg chg="modNotesTx">
+        <pc:chgData name="Ling Lin" userId="3d6e919fa8345f6d" providerId="LiveId" clId="{D365C901-0AEA-4ED5-8477-EC8CE4BC4AF5}" dt="2018-04-26T01:54:25.579" v="173" actId="20577"/>
         <pc:sldMkLst>
           <pc:docMk/>
-          <pc:sldMk cId="3334288172" sldId="262"/>
+          <pc:sldMk cId="2353576639" sldId="263"/>
         </pc:sldMkLst>
-        <pc:picChg chg="add del mod">
-          <ac:chgData name="Ling Lin" userId="3d6e919fa8345f6d" providerId="LiveId" clId="{D365C901-0AEA-4ED5-8477-EC8CE4BC4AF5}" dt="2018-04-23T05:05:13.537" v="19" actId="478"/>
-          <ac:picMkLst>
-            <pc:docMk/>
-            <pc:sldMk cId="3334288172" sldId="262"/>
-            <ac:picMk id="4" creationId="{EE5C5715-BBC3-4FCD-A5CC-512EC8AEEA61}"/>
-          </ac:picMkLst>
-        </pc:picChg>
-        <pc:picChg chg="add del mod">
-          <ac:chgData name="Ling Lin" userId="3d6e919fa8345f6d" providerId="LiveId" clId="{D365C901-0AEA-4ED5-8477-EC8CE4BC4AF5}" dt="2018-04-23T05:08:32.606" v="22" actId="478"/>
-          <ac:picMkLst>
-            <pc:docMk/>
-            <pc:sldMk cId="3334288172" sldId="262"/>
-            <ac:picMk id="5" creationId="{013F1F2B-812D-451A-8D5C-A6FDD19C9805}"/>
-          </ac:picMkLst>
-        </pc:picChg>
       </pc:sldChg>
       <pc:sldChg chg="addSp modSp modAnim">
         <pc:chgData name="Ling Lin" userId="3d6e919fa8345f6d" providerId="LiveId" clId="{D365C901-0AEA-4ED5-8477-EC8CE4BC4AF5}" dt="2018-04-23T05:25:12.458" v="41" actId="5793"/>
@@ -795,13 +737,6 @@
           </ac:picMkLst>
         </pc:picChg>
       </pc:sldChg>
-      <pc:sldChg chg="add del">
-        <pc:chgData name="Ling Lin" userId="3d6e919fa8345f6d" providerId="LiveId" clId="{D365C901-0AEA-4ED5-8477-EC8CE4BC4AF5}" dt="2018-04-23T04:01:28.919" v="3" actId="5793"/>
-        <pc:sldMkLst>
-          <pc:docMk/>
-          <pc:sldMk cId="4006181515" sldId="267"/>
-        </pc:sldMkLst>
-      </pc:sldChg>
       <pc:sldChg chg="modSp add">
         <pc:chgData name="Ling Lin" userId="3d6e919fa8345f6d" providerId="LiveId" clId="{D365C901-0AEA-4ED5-8477-EC8CE4BC4AF5}" dt="2018-04-23T23:44:34.336" v="67" actId="14100"/>
         <pc:sldMkLst>
@@ -814,45 +749,6 @@
             <pc:docMk/>
             <pc:sldMk cId="1656709482" sldId="268"/>
             <ac:picMk id="4" creationId="{3E11B4DA-5414-4407-B10B-E3CF7C6C33CD}"/>
-          </ac:picMkLst>
-        </pc:picChg>
-      </pc:sldChg>
-      <pc:sldChg chg="addSp delSp modSp add del delAnim modAnim">
-        <pc:chgData name="Ling Lin" userId="3d6e919fa8345f6d" providerId="LiveId" clId="{D365C901-0AEA-4ED5-8477-EC8CE4BC4AF5}" dt="2018-04-23T05:21:35.343" v="31" actId="2696"/>
-        <pc:sldMkLst>
-          <pc:docMk/>
-          <pc:sldMk cId="3734378877" sldId="268"/>
-        </pc:sldMkLst>
-        <pc:picChg chg="add del mod">
-          <ac:chgData name="Ling Lin" userId="3d6e919fa8345f6d" providerId="LiveId" clId="{D365C901-0AEA-4ED5-8477-EC8CE4BC4AF5}" dt="2018-04-23T05:10:03.716" v="24" actId="478"/>
-          <ac:picMkLst>
-            <pc:docMk/>
-            <pc:sldMk cId="3734378877" sldId="268"/>
-            <ac:picMk id="2" creationId="{03D6CCE8-7D46-4EA3-A4D7-1C4614EF8DE4}"/>
-          </ac:picMkLst>
-        </pc:picChg>
-        <pc:picChg chg="add del mod">
-          <ac:chgData name="Ling Lin" userId="3d6e919fa8345f6d" providerId="LiveId" clId="{D365C901-0AEA-4ED5-8477-EC8CE4BC4AF5}" dt="2018-04-23T05:12:35.082" v="26" actId="478"/>
-          <ac:picMkLst>
-            <pc:docMk/>
-            <pc:sldMk cId="3734378877" sldId="268"/>
-            <ac:picMk id="3" creationId="{63BF0948-3939-430C-B7C4-4E64F264E1D8}"/>
-          </ac:picMkLst>
-        </pc:picChg>
-        <pc:picChg chg="add del mod">
-          <ac:chgData name="Ling Lin" userId="3d6e919fa8345f6d" providerId="LiveId" clId="{D365C901-0AEA-4ED5-8477-EC8CE4BC4AF5}" dt="2018-04-23T05:13:29.820" v="28" actId="478"/>
-          <ac:picMkLst>
-            <pc:docMk/>
-            <pc:sldMk cId="3734378877" sldId="268"/>
-            <ac:picMk id="4" creationId="{0FF3AFA9-2AC0-447D-AB06-DE92CE8601EC}"/>
-          </ac:picMkLst>
-        </pc:picChg>
-        <pc:picChg chg="add del mod">
-          <ac:chgData name="Ling Lin" userId="3d6e919fa8345f6d" providerId="LiveId" clId="{D365C901-0AEA-4ED5-8477-EC8CE4BC4AF5}" dt="2018-04-23T05:15:16.190" v="30" actId="478"/>
-          <ac:picMkLst>
-            <pc:docMk/>
-            <pc:sldMk cId="3734378877" sldId="268"/>
-            <ac:picMk id="5" creationId="{911ADAD4-1048-4198-9F7F-A389AB54746F}"/>
           </ac:picMkLst>
         </pc:picChg>
       </pc:sldChg>
@@ -871,15 +767,8 @@
           </ac:spMkLst>
         </pc:spChg>
       </pc:sldChg>
-      <pc:sldChg chg="add del">
-        <pc:chgData name="Ling Lin" userId="3d6e919fa8345f6d" providerId="LiveId" clId="{D365C901-0AEA-4ED5-8477-EC8CE4BC4AF5}" dt="2018-04-24T00:12:55.321" v="152" actId="2696"/>
-        <pc:sldMkLst>
-          <pc:docMk/>
-          <pc:sldMk cId="3579070261" sldId="270"/>
-        </pc:sldMkLst>
-      </pc:sldChg>
       <pc:sldChg chg="addSp delSp modSp add">
-        <pc:chgData name="Ling Lin" userId="3d6e919fa8345f6d" providerId="LiveId" clId="{D365C901-0AEA-4ED5-8477-EC8CE4BC4AF5}" dt="2018-04-24T00:12:11.708" v="151" actId="20577"/>
+        <pc:chgData name="Ling Lin" userId="3d6e919fa8345f6d" providerId="LiveId" clId="{D365C901-0AEA-4ED5-8477-EC8CE4BC4AF5}" dt="2018-04-26T04:11:41.119" v="192" actId="1076"/>
         <pc:sldMkLst>
           <pc:docMk/>
           <pc:sldMk cId="2031099733" sldId="271"/>
@@ -901,6 +790,14 @@
           </ac:spMkLst>
         </pc:spChg>
         <pc:spChg chg="add del mod">
+          <ac:chgData name="Ling Lin" userId="3d6e919fa8345f6d" providerId="LiveId" clId="{D365C901-0AEA-4ED5-8477-EC8CE4BC4AF5}" dt="2018-04-26T04:08:50.803" v="181"/>
+          <ac:spMkLst>
+            <pc:docMk/>
+            <pc:sldMk cId="2031099733" sldId="271"/>
+            <ac:spMk id="4" creationId="{A194FD23-63CC-472A-88C1-A900FFB6A9E8}"/>
+          </ac:spMkLst>
+        </pc:spChg>
+        <pc:spChg chg="add del mod">
           <ac:chgData name="Ling Lin" userId="3d6e919fa8345f6d" providerId="LiveId" clId="{D365C901-0AEA-4ED5-8477-EC8CE4BC4AF5}" dt="2018-04-24T00:05:27.382" v="79" actId="20577"/>
           <ac:spMkLst>
             <pc:docMk/>
@@ -916,8 +813,8 @@
             <ac:picMk id="4" creationId="{9358011E-E5A5-4D0D-BD09-89F468C66FDB}"/>
           </ac:picMkLst>
         </pc:picChg>
-        <pc:picChg chg="add mod">
-          <ac:chgData name="Ling Lin" userId="3d6e919fa8345f6d" providerId="LiveId" clId="{D365C901-0AEA-4ED5-8477-EC8CE4BC4AF5}" dt="2018-04-24T00:11:30.502" v="112" actId="14100"/>
+        <pc:picChg chg="add del mod">
+          <ac:chgData name="Ling Lin" userId="3d6e919fa8345f6d" providerId="LiveId" clId="{D365C901-0AEA-4ED5-8477-EC8CE4BC4AF5}" dt="2018-04-26T04:08:43.154" v="180" actId="478"/>
           <ac:picMkLst>
             <pc:docMk/>
             <pc:sldMk cId="2031099733" sldId="271"/>
@@ -925,74 +822,59 @@
           </ac:picMkLst>
         </pc:picChg>
         <pc:picChg chg="add mod">
-          <ac:chgData name="Ling Lin" userId="3d6e919fa8345f6d" providerId="LiveId" clId="{D365C901-0AEA-4ED5-8477-EC8CE4BC4AF5}" dt="2018-04-24T00:11:45.396" v="118" actId="14100"/>
+          <ac:chgData name="Ling Lin" userId="3d6e919fa8345f6d" providerId="LiveId" clId="{D365C901-0AEA-4ED5-8477-EC8CE4BC4AF5}" dt="2018-04-26T04:11:37.927" v="191" actId="1076"/>
+          <ac:picMkLst>
+            <pc:docMk/>
+            <pc:sldMk cId="2031099733" sldId="271"/>
+            <ac:picMk id="6" creationId="{610708AB-0140-4453-A197-3C674FF40152}"/>
+          </ac:picMkLst>
+        </pc:picChg>
+        <pc:picChg chg="add mod">
+          <ac:chgData name="Ling Lin" userId="3d6e919fa8345f6d" providerId="LiveId" clId="{D365C901-0AEA-4ED5-8477-EC8CE4BC4AF5}" dt="2018-04-26T04:11:41.119" v="192" actId="1076"/>
+          <ac:picMkLst>
+            <pc:docMk/>
+            <pc:sldMk cId="2031099733" sldId="271"/>
+            <ac:picMk id="7" creationId="{1171DD10-1CC9-47CB-AADD-1444659C7E79}"/>
+          </ac:picMkLst>
+        </pc:picChg>
+        <pc:picChg chg="add del mod">
+          <ac:chgData name="Ling Lin" userId="3d6e919fa8345f6d" providerId="LiveId" clId="{D365C901-0AEA-4ED5-8477-EC8CE4BC4AF5}" dt="2018-04-26T04:08:34.363" v="178" actId="478"/>
           <ac:picMkLst>
             <pc:docMk/>
             <pc:sldMk cId="2031099733" sldId="271"/>
             <ac:picMk id="8" creationId="{93A9F0E1-95F7-4AF9-BDDC-E0A300C7990F}"/>
           </ac:picMkLst>
         </pc:picChg>
-        <pc:picChg chg="add mod">
-          <ac:chgData name="Ling Lin" userId="3d6e919fa8345f6d" providerId="LiveId" clId="{D365C901-0AEA-4ED5-8477-EC8CE4BC4AF5}" dt="2018-04-24T00:11:25.943" v="110" actId="1076"/>
+        <pc:picChg chg="add del mod">
+          <ac:chgData name="Ling Lin" userId="3d6e919fa8345f6d" providerId="LiveId" clId="{D365C901-0AEA-4ED5-8477-EC8CE4BC4AF5}" dt="2018-04-26T04:08:32.594" v="175" actId="478"/>
           <ac:picMkLst>
             <pc:docMk/>
             <pc:sldMk cId="2031099733" sldId="271"/>
             <ac:picMk id="9" creationId="{188FB8F1-80A0-43F4-A34B-0D4774A73A00}"/>
           </ac:picMkLst>
         </pc:picChg>
-        <pc:picChg chg="add mod">
-          <ac:chgData name="Ling Lin" userId="3d6e919fa8345f6d" providerId="LiveId" clId="{D365C901-0AEA-4ED5-8477-EC8CE4BC4AF5}" dt="2018-04-24T00:11:41.109" v="116" actId="14100"/>
+        <pc:picChg chg="add del mod">
+          <ac:chgData name="Ling Lin" userId="3d6e919fa8345f6d" providerId="LiveId" clId="{D365C901-0AEA-4ED5-8477-EC8CE4BC4AF5}" dt="2018-04-26T04:08:33.826" v="177" actId="478"/>
           <ac:picMkLst>
             <pc:docMk/>
             <pc:sldMk cId="2031099733" sldId="271"/>
             <ac:picMk id="10" creationId="{4E3C038A-5C62-4FC2-9401-D0F949CF3D30}"/>
           </ac:picMkLst>
         </pc:picChg>
-        <pc:picChg chg="add mod">
-          <ac:chgData name="Ling Lin" userId="3d6e919fa8345f6d" providerId="LiveId" clId="{D365C901-0AEA-4ED5-8477-EC8CE4BC4AF5}" dt="2018-04-24T00:11:35.373" v="114" actId="14100"/>
+        <pc:picChg chg="add del mod">
+          <ac:chgData name="Ling Lin" userId="3d6e919fa8345f6d" providerId="LiveId" clId="{D365C901-0AEA-4ED5-8477-EC8CE4BC4AF5}" dt="2018-04-26T04:08:33.257" v="176" actId="478"/>
           <ac:picMkLst>
             <pc:docMk/>
             <pc:sldMk cId="2031099733" sldId="271"/>
             <ac:picMk id="11" creationId="{96BA98B3-B4E8-4D75-A446-FF1706BB83B8}"/>
           </ac:picMkLst>
         </pc:picChg>
-        <pc:picChg chg="add mod">
-          <ac:chgData name="Ling Lin" userId="3d6e919fa8345f6d" providerId="LiveId" clId="{D365C901-0AEA-4ED5-8477-EC8CE4BC4AF5}" dt="2018-04-24T00:11:23.590" v="109" actId="1076"/>
+        <pc:picChg chg="add del mod">
+          <ac:chgData name="Ling Lin" userId="3d6e919fa8345f6d" providerId="LiveId" clId="{D365C901-0AEA-4ED5-8477-EC8CE4BC4AF5}" dt="2018-04-26T04:08:30.627" v="174" actId="478"/>
           <ac:picMkLst>
             <pc:docMk/>
             <pc:sldMk cId="2031099733" sldId="271"/>
             <ac:picMk id="12" creationId="{5F0CCB4A-1945-47D9-8734-067465BA0078}"/>
-          </ac:picMkLst>
-        </pc:picChg>
-      </pc:sldChg>
-      <pc:sldChg chg="addSp delSp modSp add del">
-        <pc:chgData name="Ling Lin" userId="3d6e919fa8345f6d" providerId="LiveId" clId="{D365C901-0AEA-4ED5-8477-EC8CE4BC4AF5}" dt="2018-04-23T23:57:49.031" v="68" actId="2696"/>
-        <pc:sldMkLst>
-          <pc:docMk/>
-          <pc:sldMk cId="2590603054" sldId="271"/>
-        </pc:sldMkLst>
-        <pc:spChg chg="mod">
-          <ac:chgData name="Ling Lin" userId="3d6e919fa8345f6d" providerId="LiveId" clId="{D365C901-0AEA-4ED5-8477-EC8CE4BC4AF5}" dt="2018-04-23T23:44:15.909" v="62" actId="20577"/>
-          <ac:spMkLst>
-            <pc:docMk/>
-            <pc:sldMk cId="2590603054" sldId="271"/>
-            <ac:spMk id="2" creationId="{31722E5D-4922-4A65-9039-A407AA53F875}"/>
-          </ac:spMkLst>
-        </pc:spChg>
-        <pc:spChg chg="del">
-          <ac:chgData name="Ling Lin" userId="3d6e919fa8345f6d" providerId="LiveId" clId="{D365C901-0AEA-4ED5-8477-EC8CE4BC4AF5}" dt="2018-04-23T23:43:36.268" v="45" actId="2696"/>
-          <ac:spMkLst>
-            <pc:docMk/>
-            <pc:sldMk cId="2590603054" sldId="271"/>
-            <ac:spMk id="3" creationId="{68AFDA4D-9A81-4EB7-BDEF-08DCD4F5720A}"/>
-          </ac:spMkLst>
-        </pc:spChg>
-        <pc:picChg chg="add mod">
-          <ac:chgData name="Ling Lin" userId="3d6e919fa8345f6d" providerId="LiveId" clId="{D365C901-0AEA-4ED5-8477-EC8CE4BC4AF5}" dt="2018-04-23T23:44:25.901" v="65" actId="14100"/>
-          <ac:picMkLst>
-            <pc:docMk/>
-            <pc:sldMk cId="2590603054" sldId="271"/>
-            <ac:picMk id="4" creationId="{638A448D-0769-47D7-ADD4-FF8B70AD3916}"/>
           </ac:picMkLst>
         </pc:picChg>
       </pc:sldChg>
@@ -1083,7 +965,7 @@
           <a:p>
             <a:fld id="{04A62F11-9C33-4E35-B4EF-C4ACD8CBC3D8}" type="datetimeFigureOut">
               <a:rPr lang="en-US"/>
-              <a:t>4/23/2018</a:t>
+              <a:t>4/25/2018</a:t>
             </a:fld>
             <a:endParaRPr lang="en-US"/>
           </a:p>
@@ -1924,11 +1806,14 @@
           <a:lstStyle/>
           <a:p>
             <a:r>
-              <a:rPr lang="en-US" dirty="0">
+              <a:rPr lang="en-US" dirty="0" err="1">
                 <a:cs typeface="Calibri"/>
               </a:rPr>
-              <a:t>Greg</a:t>
-            </a:r>
+              <a:t>Gregsn</a:t>
+            </a:r>
+            <a:endParaRPr lang="en-US" dirty="0">
+              <a:cs typeface="Calibri"/>
+            </a:endParaRPr>
           </a:p>
         </p:txBody>
       </p:sp>
@@ -2283,7 +2168,7 @@
           <a:p>
             <a:fld id="{F1FA7AC5-6045-4418-8E60-F48788734473}" type="datetimeFigureOut">
               <a:rPr lang="en-US" smtClean="0"/>
-              <a:t>4/23/2018</a:t>
+              <a:t>4/25/2018</a:t>
             </a:fld>
             <a:endParaRPr lang="en-US"/>
           </a:p>
@@ -2459,7 +2344,7 @@
           <a:p>
             <a:fld id="{F1FA7AC5-6045-4418-8E60-F48788734473}" type="datetimeFigureOut">
               <a:rPr lang="en-US" smtClean="0"/>
-              <a:t>4/23/2018</a:t>
+              <a:t>4/25/2018</a:t>
             </a:fld>
             <a:endParaRPr lang="en-US"/>
           </a:p>
@@ -2645,7 +2530,7 @@
           <a:p>
             <a:fld id="{F1FA7AC5-6045-4418-8E60-F48788734473}" type="datetimeFigureOut">
               <a:rPr lang="en-US" smtClean="0"/>
-              <a:t>4/23/2018</a:t>
+              <a:t>4/25/2018</a:t>
             </a:fld>
             <a:endParaRPr lang="en-US"/>
           </a:p>
@@ -2821,7 +2706,7 @@
           <a:p>
             <a:fld id="{F1FA7AC5-6045-4418-8E60-F48788734473}" type="datetimeFigureOut">
               <a:rPr lang="en-US" smtClean="0"/>
-              <a:t>4/23/2018</a:t>
+              <a:t>4/25/2018</a:t>
             </a:fld>
             <a:endParaRPr lang="en-US"/>
           </a:p>
@@ -3074,7 +2959,7 @@
           <a:p>
             <a:fld id="{F1FA7AC5-6045-4418-8E60-F48788734473}" type="datetimeFigureOut">
               <a:rPr lang="en-US" smtClean="0"/>
-              <a:t>4/23/2018</a:t>
+              <a:t>4/25/2018</a:t>
             </a:fld>
             <a:endParaRPr lang="en-US"/>
           </a:p>
@@ -3311,7 +3196,7 @@
           <a:p>
             <a:fld id="{F1FA7AC5-6045-4418-8E60-F48788734473}" type="datetimeFigureOut">
               <a:rPr lang="en-US" smtClean="0"/>
-              <a:t>4/23/2018</a:t>
+              <a:t>4/25/2018</a:t>
             </a:fld>
             <a:endParaRPr lang="en-US"/>
           </a:p>
@@ -3683,7 +3568,7 @@
           <a:p>
             <a:fld id="{F1FA7AC5-6045-4418-8E60-F48788734473}" type="datetimeFigureOut">
               <a:rPr lang="en-US" smtClean="0"/>
-              <a:t>4/23/2018</a:t>
+              <a:t>4/25/2018</a:t>
             </a:fld>
             <a:endParaRPr lang="en-US"/>
           </a:p>
@@ -3808,7 +3693,7 @@
           <a:p>
             <a:fld id="{F1FA7AC5-6045-4418-8E60-F48788734473}" type="datetimeFigureOut">
               <a:rPr lang="en-US" smtClean="0"/>
-              <a:t>4/23/2018</a:t>
+              <a:t>4/25/2018</a:t>
             </a:fld>
             <a:endParaRPr lang="en-US"/>
           </a:p>
@@ -3911,7 +3796,7 @@
           <a:p>
             <a:fld id="{F1FA7AC5-6045-4418-8E60-F48788734473}" type="datetimeFigureOut">
               <a:rPr lang="en-US" smtClean="0"/>
-              <a:t>4/23/2018</a:t>
+              <a:t>4/25/2018</a:t>
             </a:fld>
             <a:endParaRPr lang="en-US"/>
           </a:p>
@@ -4194,7 +4079,7 @@
           <a:p>
             <a:fld id="{F1FA7AC5-6045-4418-8E60-F48788734473}" type="datetimeFigureOut">
               <a:rPr lang="en-US" smtClean="0"/>
-              <a:t>4/23/2018</a:t>
+              <a:t>4/25/2018</a:t>
             </a:fld>
             <a:endParaRPr lang="en-US"/>
           </a:p>
@@ -4457,7 +4342,7 @@
           <a:p>
             <a:fld id="{F1FA7AC5-6045-4418-8E60-F48788734473}" type="datetimeFigureOut">
               <a:rPr lang="en-US" smtClean="0"/>
-              <a:t>4/23/2018</a:t>
+              <a:t>4/25/2018</a:t>
             </a:fld>
             <a:endParaRPr lang="en-US"/>
           </a:p>
@@ -5433,10 +5318,42 @@
       </p:sp>
       <p:pic>
         <p:nvPicPr>
-          <p:cNvPr id="5" name="Picture 4">
+          <p:cNvPr id="6" name="Content Placeholder 5">
             <a:extLst>
               <a:ext uri="{FF2B5EF4-FFF2-40B4-BE49-F238E27FC236}">
-                <a16:creationId xmlns:a16="http://schemas.microsoft.com/office/drawing/2014/main" id="{9E1427F5-643E-41AE-966A-BC2A67B1AEAE}"/>
+                <a16:creationId xmlns:a16="http://schemas.microsoft.com/office/drawing/2014/main" id="{610708AB-0140-4453-A197-3C674FF40152}"/>
+              </a:ext>
+            </a:extLst>
+          </p:cNvPr>
+          <p:cNvPicPr>
+            <a:picLocks noGrp="1" noChangeAspect="1"/>
+          </p:cNvPicPr>
+          <p:nvPr>
+            <p:ph idx="1"/>
+          </p:nvPr>
+        </p:nvPicPr>
+        <p:blipFill>
+          <a:blip r:embed="rId2"/>
+          <a:stretch>
+            <a:fillRect/>
+          </a:stretch>
+        </p:blipFill>
+        <p:spPr>
+          <a:xfrm>
+            <a:off x="2735120" y="1520375"/>
+            <a:ext cx="6721759" cy="4351338"/>
+          </a:xfrm>
+          <a:prstGeom prst="rect">
+            <a:avLst/>
+          </a:prstGeom>
+        </p:spPr>
+      </p:pic>
+      <p:pic>
+        <p:nvPicPr>
+          <p:cNvPr id="7" name="Picture 6">
+            <a:extLst>
+              <a:ext uri="{FF2B5EF4-FFF2-40B4-BE49-F238E27FC236}">
+                <a16:creationId xmlns:a16="http://schemas.microsoft.com/office/drawing/2014/main" id="{1171DD10-1CC9-47CB-AADD-1444659C7E79}"/>
               </a:ext>
             </a:extLst>
           </p:cNvPr>
@@ -5446,38 +5363,6 @@
           <p:nvPr/>
         </p:nvPicPr>
         <p:blipFill>
-          <a:blip r:embed="rId2"/>
-          <a:stretch>
-            <a:fillRect/>
-          </a:stretch>
-        </p:blipFill>
-        <p:spPr>
-          <a:xfrm>
-            <a:off x="981034" y="4977969"/>
-            <a:ext cx="4524015" cy="1342386"/>
-          </a:xfrm>
-          <a:prstGeom prst="rect">
-            <a:avLst/>
-          </a:prstGeom>
-        </p:spPr>
-      </p:pic>
-      <p:pic>
-        <p:nvPicPr>
-          <p:cNvPr id="8" name="Content Placeholder 7">
-            <a:extLst>
-              <a:ext uri="{FF2B5EF4-FFF2-40B4-BE49-F238E27FC236}">
-                <a16:creationId xmlns:a16="http://schemas.microsoft.com/office/drawing/2014/main" id="{93A9F0E1-95F7-4AF9-BDDC-E0A300C7990F}"/>
-              </a:ext>
-            </a:extLst>
-          </p:cNvPr>
-          <p:cNvPicPr>
-            <a:picLocks noGrp="1" noChangeAspect="1"/>
-          </p:cNvPicPr>
-          <p:nvPr>
-            <p:ph idx="1"/>
-          </p:nvPr>
-        </p:nvPicPr>
-        <p:blipFill>
           <a:blip r:embed="rId3"/>
           <a:stretch>
             <a:fillRect/>
@@ -5485,128 +5370,8 @@
         </p:blipFill>
         <p:spPr>
           <a:xfrm>
-            <a:off x="6003146" y="4972372"/>
-            <a:ext cx="5347828" cy="1347983"/>
-          </a:xfrm>
-          <a:prstGeom prst="rect">
-            <a:avLst/>
-          </a:prstGeom>
-        </p:spPr>
-      </p:pic>
-      <p:pic>
-        <p:nvPicPr>
-          <p:cNvPr id="9" name="Picture 8">
-            <a:extLst>
-              <a:ext uri="{FF2B5EF4-FFF2-40B4-BE49-F238E27FC236}">
-                <a16:creationId xmlns:a16="http://schemas.microsoft.com/office/drawing/2014/main" id="{188FB8F1-80A0-43F4-A34B-0D4774A73A00}"/>
-              </a:ext>
-            </a:extLst>
-          </p:cNvPr>
-          <p:cNvPicPr>
-            <a:picLocks noChangeAspect="1"/>
-          </p:cNvPicPr>
-          <p:nvPr/>
-        </p:nvPicPr>
-        <p:blipFill>
-          <a:blip r:embed="rId4"/>
-          <a:stretch>
-            <a:fillRect/>
-          </a:stretch>
-        </p:blipFill>
-        <p:spPr>
-          <a:xfrm>
-            <a:off x="981034" y="3429000"/>
-            <a:ext cx="4524015" cy="1325562"/>
-          </a:xfrm>
-          <a:prstGeom prst="rect">
-            <a:avLst/>
-          </a:prstGeom>
-        </p:spPr>
-      </p:pic>
-      <p:pic>
-        <p:nvPicPr>
-          <p:cNvPr id="10" name="Picture 9">
-            <a:extLst>
-              <a:ext uri="{FF2B5EF4-FFF2-40B4-BE49-F238E27FC236}">
-                <a16:creationId xmlns:a16="http://schemas.microsoft.com/office/drawing/2014/main" id="{4E3C038A-5C62-4FC2-9401-D0F949CF3D30}"/>
-              </a:ext>
-            </a:extLst>
-          </p:cNvPr>
-          <p:cNvPicPr>
-            <a:picLocks noChangeAspect="1"/>
-          </p:cNvPicPr>
-          <p:nvPr/>
-        </p:nvPicPr>
-        <p:blipFill>
-          <a:blip r:embed="rId5"/>
-          <a:stretch>
-            <a:fillRect/>
-          </a:stretch>
-        </p:blipFill>
-        <p:spPr>
-          <a:xfrm>
-            <a:off x="6003146" y="3456152"/>
-            <a:ext cx="5347829" cy="1320831"/>
-          </a:xfrm>
-          <a:prstGeom prst="rect">
-            <a:avLst/>
-          </a:prstGeom>
-        </p:spPr>
-      </p:pic>
-      <p:pic>
-        <p:nvPicPr>
-          <p:cNvPr id="11" name="Picture 10">
-            <a:extLst>
-              <a:ext uri="{FF2B5EF4-FFF2-40B4-BE49-F238E27FC236}">
-                <a16:creationId xmlns:a16="http://schemas.microsoft.com/office/drawing/2014/main" id="{96BA98B3-B4E8-4D75-A446-FF1706BB83B8}"/>
-              </a:ext>
-            </a:extLst>
-          </p:cNvPr>
-          <p:cNvPicPr>
-            <a:picLocks noChangeAspect="1"/>
-          </p:cNvPicPr>
-          <p:nvPr/>
-        </p:nvPicPr>
-        <p:blipFill>
-          <a:blip r:embed="rId6"/>
-          <a:stretch>
-            <a:fillRect/>
-          </a:stretch>
-        </p:blipFill>
-        <p:spPr>
-          <a:xfrm>
-            <a:off x="6003147" y="1853638"/>
-            <a:ext cx="5347830" cy="1370381"/>
-          </a:xfrm>
-          <a:prstGeom prst="rect">
-            <a:avLst/>
-          </a:prstGeom>
-        </p:spPr>
-      </p:pic>
-      <p:pic>
-        <p:nvPicPr>
-          <p:cNvPr id="12" name="Picture 11">
-            <a:extLst>
-              <a:ext uri="{FF2B5EF4-FFF2-40B4-BE49-F238E27FC236}">
-                <a16:creationId xmlns:a16="http://schemas.microsoft.com/office/drawing/2014/main" id="{5F0CCB4A-1945-47D9-8734-067465BA0078}"/>
-              </a:ext>
-            </a:extLst>
-          </p:cNvPr>
-          <p:cNvPicPr>
-            <a:picLocks noChangeAspect="1"/>
-          </p:cNvPicPr>
-          <p:nvPr/>
-        </p:nvPicPr>
-        <p:blipFill>
-          <a:blip r:embed="rId7"/>
-          <a:stretch>
-            <a:fillRect/>
-          </a:stretch>
-        </p:blipFill>
-        <p:spPr>
-          <a:xfrm>
-            <a:off x="981034" y="1835212"/>
-            <a:ext cx="4524015" cy="1370381"/>
+            <a:off x="2735120" y="5871713"/>
+            <a:ext cx="6721759" cy="817950"/>
           </a:xfrm>
           <a:prstGeom prst="rect">
             <a:avLst/>
@@ -5674,46 +5439,312 @@
           </a:p>
         </p:txBody>
       </p:sp>
-      <p:sp>
-        <p:nvSpPr>
-          <p:cNvPr id="3" name="Content Placeholder 2">
+      <p:pic>
+        <p:nvPicPr>
+          <p:cNvPr id="7" name="Picture 6">
             <a:extLst>
               <a:ext uri="{FF2B5EF4-FFF2-40B4-BE49-F238E27FC236}">
-                <a16:creationId xmlns:a16="http://schemas.microsoft.com/office/drawing/2014/main" id="{73BD988B-5D74-4B82-9215-410781D318E6}"/>
+                <a16:creationId xmlns:a16="http://schemas.microsoft.com/office/drawing/2014/main" id="{C90898D5-E64D-4050-988A-60EB0145FDE7}"/>
               </a:ext>
             </a:extLst>
           </p:cNvPr>
-          <p:cNvSpPr>
-            <a:spLocks noGrp="1"/>
-          </p:cNvSpPr>
-          <p:nvPr>
-            <p:ph idx="1"/>
-          </p:nvPr>
-        </p:nvSpPr>
-        <p:spPr/>
-        <p:txBody>
-          <a:bodyPr vert="horz" lIns="91440" tIns="45720" rIns="91440" bIns="45720" rtlCol="0" anchor="t">
-            <a:normAutofit/>
+          <p:cNvPicPr>
+            <a:picLocks noChangeAspect="1"/>
+          </p:cNvPicPr>
+          <p:nvPr/>
+        </p:nvPicPr>
+        <p:blipFill>
+          <a:blip r:embed="rId7">
+            <a:clrChange>
+              <a:clrFrom>
+                <a:srgbClr val="FFFFFF"/>
+              </a:clrFrom>
+              <a:clrTo>
+                <a:srgbClr val="FFFFFF">
+                  <a:alpha val="0"/>
+                </a:srgbClr>
+              </a:clrTo>
+            </a:clrChange>
+            <a:extLst>
+              <a:ext uri="{28A0092B-C50C-407E-A947-70E740481C1C}">
+                <a14:useLocalDpi xmlns:a14="http://schemas.microsoft.com/office/drawing/2010/main" val="0"/>
+              </a:ext>
+            </a:extLst>
+          </a:blip>
+          <a:stretch>
+            <a:fillRect/>
+          </a:stretch>
+        </p:blipFill>
+        <p:spPr>
+          <a:xfrm>
+            <a:off x="609600" y="3368107"/>
+            <a:ext cx="10972800" cy="1756463"/>
+          </a:xfrm>
+          <a:prstGeom prst="rect">
+            <a:avLst/>
+          </a:prstGeom>
+        </p:spPr>
+      </p:pic>
+      <p:pic>
+        <p:nvPicPr>
+          <p:cNvPr id="9" name="Picture 8">
+            <a:extLst>
+              <a:ext uri="{FF2B5EF4-FFF2-40B4-BE49-F238E27FC236}">
+                <a16:creationId xmlns:a16="http://schemas.microsoft.com/office/drawing/2014/main" id="{41C34A5B-EB5E-4FC9-8AF4-D6B4C34E18E8}"/>
+              </a:ext>
+            </a:extLst>
+          </p:cNvPr>
+          <p:cNvPicPr>
+            <a:picLocks noChangeAspect="1"/>
+          </p:cNvPicPr>
+          <p:nvPr/>
+        </p:nvPicPr>
+        <p:blipFill>
+          <a:blip r:embed="rId8">
+            <a:clrChange>
+              <a:clrFrom>
+                <a:srgbClr val="FFFFFF"/>
+              </a:clrFrom>
+              <a:clrTo>
+                <a:srgbClr val="FFFFFF">
+                  <a:alpha val="0"/>
+                </a:srgbClr>
+              </a:clrTo>
+            </a:clrChange>
+            <a:extLst>
+              <a:ext uri="{28A0092B-C50C-407E-A947-70E740481C1C}">
+                <a14:useLocalDpi xmlns:a14="http://schemas.microsoft.com/office/drawing/2010/main" val="0"/>
+              </a:ext>
+            </a:extLst>
+          </a:blip>
+          <a:stretch>
+            <a:fillRect/>
+          </a:stretch>
+        </p:blipFill>
+        <p:spPr>
+          <a:xfrm>
+            <a:off x="609600" y="1899518"/>
+            <a:ext cx="10972800" cy="1460775"/>
+          </a:xfrm>
+          <a:prstGeom prst="rect">
+            <a:avLst/>
+          </a:prstGeom>
+        </p:spPr>
+      </p:pic>
+      <p:sp>
+        <p:nvSpPr>
+          <p:cNvPr id="10" name="Rectangle 9">
+            <a:extLst>
+              <a:ext uri="{FF2B5EF4-FFF2-40B4-BE49-F238E27FC236}">
+                <a16:creationId xmlns:a16="http://schemas.microsoft.com/office/drawing/2014/main" id="{64D9F0F4-C9FF-452E-B21D-734467535015}"/>
+              </a:ext>
+            </a:extLst>
+          </p:cNvPr>
+          <p:cNvSpPr/>
+          <p:nvPr/>
+        </p:nvSpPr>
+        <p:spPr>
+          <a:xfrm>
+            <a:off x="4475110" y="1690688"/>
+            <a:ext cx="4341886" cy="3238594"/>
+          </a:xfrm>
+          <a:prstGeom prst="rect">
+            <a:avLst/>
+          </a:prstGeom>
+          <a:solidFill>
+            <a:schemeClr val="accent2">
+              <a:alpha val="20000"/>
+            </a:schemeClr>
+          </a:solidFill>
+          <a:ln>
+            <a:solidFill>
+              <a:schemeClr val="accent2"/>
+            </a:solidFill>
+          </a:ln>
+        </p:spPr>
+        <p:style>
+          <a:lnRef idx="2">
+            <a:schemeClr val="accent1">
+              <a:shade val="50000"/>
+            </a:schemeClr>
+          </a:lnRef>
+          <a:fillRef idx="1">
+            <a:schemeClr val="accent1"/>
+          </a:fillRef>
+          <a:effectRef idx="0">
+            <a:schemeClr val="accent1"/>
+          </a:effectRef>
+          <a:fontRef idx="minor">
+            <a:schemeClr val="lt1"/>
+          </a:fontRef>
+        </p:style>
+        <p:txBody>
+          <a:bodyPr rtlCol="0" anchor="t"/>
+          <a:lstStyle/>
+          <a:p>
+            <a:pPr algn="ctr"/>
+            <a:r>
+              <a:rPr lang="en-US" dirty="0">
+                <a:solidFill>
+                  <a:schemeClr val="accent2"/>
+                </a:solidFill>
+                <a:latin typeface="Arial Black" panose="020B0A04020102020204" pitchFamily="34" charset="0"/>
+              </a:rPr>
+              <a:t>Infilled Sequence</a:t>
+            </a:r>
+          </a:p>
+        </p:txBody>
+      </p:sp>
+      <p:sp>
+        <p:nvSpPr>
+          <p:cNvPr id="11" name="TextBox 10">
+            <a:extLst>
+              <a:ext uri="{FF2B5EF4-FFF2-40B4-BE49-F238E27FC236}">
+                <a16:creationId xmlns:a16="http://schemas.microsoft.com/office/drawing/2014/main" id="{9CF8B745-BB3B-48F5-9D6E-8A78EBB8DBBD}"/>
+              </a:ext>
+            </a:extLst>
+          </p:cNvPr>
+          <p:cNvSpPr txBox="1"/>
+          <p:nvPr/>
+        </p:nvSpPr>
+        <p:spPr>
+          <a:xfrm>
+            <a:off x="369794" y="1848971"/>
+            <a:ext cx="1196788" cy="369332"/>
+          </a:xfrm>
+          <a:prstGeom prst="rect">
+            <a:avLst/>
+          </a:prstGeom>
+          <a:noFill/>
+        </p:spPr>
+        <p:txBody>
+          <a:bodyPr wrap="square" rtlCol="0">
+            <a:spAutoFit/>
           </a:bodyPr>
           <a:lstStyle/>
           <a:p>
             <a:r>
               <a:rPr lang="en-US" dirty="0">
-                <a:cs typeface="Calibri"/>
+                <a:latin typeface="Arial Black" panose="020B0A04020102020204" pitchFamily="34" charset="0"/>
               </a:rPr>
-              <a:t>[Illustration of musical scores]</a:t>
-            </a:r>
-          </a:p>
+              <a:t>Original</a:t>
+            </a:r>
+          </a:p>
+        </p:txBody>
+      </p:sp>
+      <p:sp>
+        <p:nvSpPr>
+          <p:cNvPr id="12" name="TextBox 11">
+            <a:extLst>
+              <a:ext uri="{FF2B5EF4-FFF2-40B4-BE49-F238E27FC236}">
+                <a16:creationId xmlns:a16="http://schemas.microsoft.com/office/drawing/2014/main" id="{F6D838D5-D79D-45B9-A788-7DD078DDF353}"/>
+              </a:ext>
+            </a:extLst>
+          </p:cNvPr>
+          <p:cNvSpPr txBox="1"/>
+          <p:nvPr/>
+        </p:nvSpPr>
+        <p:spPr>
+          <a:xfrm>
+            <a:off x="367547" y="3520890"/>
+            <a:ext cx="1501593" cy="369332"/>
+          </a:xfrm>
+          <a:prstGeom prst="rect">
+            <a:avLst/>
+          </a:prstGeom>
+          <a:noFill/>
+        </p:spPr>
+        <p:txBody>
+          <a:bodyPr wrap="square" rtlCol="0">
+            <a:spAutoFit/>
+          </a:bodyPr>
+          <a:lstStyle/>
           <a:p>
             <a:r>
               <a:rPr lang="en-US" dirty="0">
-                <a:cs typeface="Calibri"/>
+                <a:latin typeface="Arial Black" panose="020B0A04020102020204" pitchFamily="34" charset="0"/>
               </a:rPr>
-              <a:t>[Play sample midis]</a:t>
-            </a:r>
-          </a:p>
-        </p:txBody>
-      </p:sp>
+              <a:t>MaskGAN</a:t>
+            </a:r>
+          </a:p>
+        </p:txBody>
+      </p:sp>
+      <p:pic>
+        <p:nvPicPr>
+          <p:cNvPr id="13" name="orig_1">
+            <a:hlinkClick r:id="" action="ppaction://media"/>
+            <a:extLst>
+              <a:ext uri="{FF2B5EF4-FFF2-40B4-BE49-F238E27FC236}">
+                <a16:creationId xmlns:a16="http://schemas.microsoft.com/office/drawing/2014/main" id="{7F970AA6-DA35-41A2-9989-6F93E1D3E0C1}"/>
+              </a:ext>
+            </a:extLst>
+          </p:cNvPr>
+          <p:cNvPicPr>
+            <a:picLocks noChangeAspect="1"/>
+          </p:cNvPicPr>
+          <p:nvPr>
+            <a:audioFile r:link="rId2"/>
+            <p:extLst>
+              <p:ext uri="{DAA4B4D4-6D71-4841-9C94-3DE7FCFB9230}">
+                <p14:media xmlns:p14="http://schemas.microsoft.com/office/powerpoint/2010/main" r:embed="rId1"/>
+              </p:ext>
+            </p:extLst>
+          </p:nvPr>
+        </p:nvPicPr>
+        <p:blipFill>
+          <a:blip r:embed="rId9"/>
+          <a:stretch>
+            <a:fillRect/>
+          </a:stretch>
+        </p:blipFill>
+        <p:spPr>
+          <a:xfrm>
+            <a:off x="11517406" y="2543734"/>
+            <a:ext cx="304800" cy="304800"/>
+          </a:xfrm>
+          <a:prstGeom prst="rect">
+            <a:avLst/>
+          </a:prstGeom>
+        </p:spPr>
+      </p:pic>
+      <p:pic>
+        <p:nvPicPr>
+          <p:cNvPr id="14" name="new_1">
+            <a:hlinkClick r:id="" action="ppaction://media"/>
+            <a:extLst>
+              <a:ext uri="{FF2B5EF4-FFF2-40B4-BE49-F238E27FC236}">
+                <a16:creationId xmlns:a16="http://schemas.microsoft.com/office/drawing/2014/main" id="{E539251D-41D8-49BE-9A02-0EB1505EAA3F}"/>
+              </a:ext>
+            </a:extLst>
+          </p:cNvPr>
+          <p:cNvPicPr>
+            <a:picLocks noChangeAspect="1"/>
+          </p:cNvPicPr>
+          <p:nvPr>
+            <a:audioFile r:link="rId4"/>
+            <p:extLst>
+              <p:ext uri="{DAA4B4D4-6D71-4841-9C94-3DE7FCFB9230}">
+                <p14:media xmlns:p14="http://schemas.microsoft.com/office/powerpoint/2010/main" r:embed="rId3"/>
+              </p:ext>
+            </p:extLst>
+          </p:nvPr>
+        </p:nvPicPr>
+        <p:blipFill>
+          <a:blip r:embed="rId9"/>
+          <a:stretch>
+            <a:fillRect/>
+          </a:stretch>
+        </p:blipFill>
+        <p:spPr>
+          <a:xfrm>
+            <a:off x="11517406" y="4226167"/>
+            <a:ext cx="304800" cy="304800"/>
+          </a:xfrm>
+          <a:prstGeom prst="rect">
+            <a:avLst/>
+          </a:prstGeom>
+        </p:spPr>
+      </p:pic>
     </p:spTree>
     <p:extLst>
       <p:ext uri="{BB962C8B-B14F-4D97-AF65-F5344CB8AC3E}">
@@ -5724,6 +5755,144 @@
   <p:clrMapOvr>
     <a:masterClrMapping/>
   </p:clrMapOvr>
+  <p:timing>
+    <p:tnLst>
+      <p:par>
+        <p:cTn id="1" dur="indefinite" restart="never" nodeType="tmRoot">
+          <p:childTnLst>
+            <p:seq concurrent="1" nextAc="seek">
+              <p:cTn id="2" dur="indefinite" nodeType="mainSeq">
+                <p:childTnLst>
+                  <p:par>
+                    <p:cTn id="3" fill="hold">
+                      <p:stCondLst>
+                        <p:cond delay="indefinite"/>
+                      </p:stCondLst>
+                      <p:childTnLst>
+                        <p:par>
+                          <p:cTn id="4" fill="hold">
+                            <p:stCondLst>
+                              <p:cond delay="0"/>
+                            </p:stCondLst>
+                            <p:childTnLst>
+                              <p:par>
+                                <p:cTn id="5" presetID="1" presetClass="mediacall" presetSubtype="0" fill="hold" nodeType="clickEffect">
+                                  <p:stCondLst>
+                                    <p:cond delay="0"/>
+                                  </p:stCondLst>
+                                  <p:childTnLst>
+                                    <p:cmd type="call" cmd="playFrom(0.0)">
+                                      <p:cBhvr>
+                                        <p:cTn id="6" dur="5000" fill="hold"/>
+                                        <p:tgtEl>
+                                          <p:spTgt spid="13"/>
+                                        </p:tgtEl>
+                                      </p:cBhvr>
+                                    </p:cmd>
+                                  </p:childTnLst>
+                                </p:cTn>
+                              </p:par>
+                            </p:childTnLst>
+                          </p:cTn>
+                        </p:par>
+                      </p:childTnLst>
+                    </p:cTn>
+                  </p:par>
+                  <p:par>
+                    <p:cTn id="7" fill="hold">
+                      <p:stCondLst>
+                        <p:cond delay="indefinite"/>
+                      </p:stCondLst>
+                      <p:childTnLst>
+                        <p:par>
+                          <p:cTn id="8" fill="hold">
+                            <p:stCondLst>
+                              <p:cond delay="0"/>
+                            </p:stCondLst>
+                            <p:childTnLst>
+                              <p:par>
+                                <p:cTn id="9" presetID="1" presetClass="mediacall" presetSubtype="0" fill="hold" nodeType="clickEffect">
+                                  <p:stCondLst>
+                                    <p:cond delay="0"/>
+                                  </p:stCondLst>
+                                  <p:childTnLst>
+                                    <p:cmd type="call" cmd="playFrom(0.0)">
+                                      <p:cBhvr>
+                                        <p:cTn id="10" dur="5000" fill="hold"/>
+                                        <p:tgtEl>
+                                          <p:spTgt spid="14"/>
+                                        </p:tgtEl>
+                                      </p:cBhvr>
+                                    </p:cmd>
+                                  </p:childTnLst>
+                                </p:cTn>
+                              </p:par>
+                            </p:childTnLst>
+                          </p:cTn>
+                        </p:par>
+                      </p:childTnLst>
+                    </p:cTn>
+                  </p:par>
+                </p:childTnLst>
+              </p:cTn>
+              <p:prevCondLst>
+                <p:cond evt="onPrev" delay="0">
+                  <p:tgtEl>
+                    <p:sldTgt/>
+                  </p:tgtEl>
+                </p:cond>
+              </p:prevCondLst>
+              <p:nextCondLst>
+                <p:cond evt="onNext" delay="0">
+                  <p:tgtEl>
+                    <p:sldTgt/>
+                  </p:tgtEl>
+                </p:cond>
+              </p:nextCondLst>
+            </p:seq>
+            <p:audio>
+              <p:cMediaNode vol="80000">
+                <p:cTn id="11" fill="hold" display="0">
+                  <p:stCondLst>
+                    <p:cond delay="indefinite"/>
+                  </p:stCondLst>
+                  <p:endCondLst>
+                    <p:cond evt="onStopAudio" delay="0">
+                      <p:tgtEl>
+                        <p:sldTgt/>
+                      </p:tgtEl>
+                    </p:cond>
+                  </p:endCondLst>
+                </p:cTn>
+                <p:tgtEl>
+                  <p:spTgt spid="13"/>
+                </p:tgtEl>
+              </p:cMediaNode>
+            </p:audio>
+            <p:audio>
+              <p:cMediaNode vol="80000">
+                <p:cTn id="12" fill="hold" display="0">
+                  <p:stCondLst>
+                    <p:cond delay="indefinite"/>
+                  </p:stCondLst>
+                  <p:endCondLst>
+                    <p:cond evt="onStopAudio" delay="0">
+                      <p:tgtEl>
+                        <p:sldTgt/>
+                      </p:tgtEl>
+                    </p:cond>
+                  </p:endCondLst>
+                </p:cTn>
+                <p:tgtEl>
+                  <p:spTgt spid="14"/>
+                </p:tgtEl>
+              </p:cMediaNode>
+            </p:audio>
+          </p:childTnLst>
+        </p:cTn>
+      </p:par>
+    </p:tnLst>
+  </p:timing>
 </p:sld>
 </file>
 

</xml_diff>